<commit_message>
high res + fix
</commit_message>
<xml_diff>
--- a/consumption_production_2016.pptx
+++ b/consumption_production_2016.pptx
@@ -115,7 +115,7 @@
 <file path=ppt/revisionInfo.xml><?xml version="1.0" encoding="utf-8"?>
 <p1510:revInfo xmlns:a="http://schemas.openxmlformats.org/drawingml/2006/main" xmlns:r="http://schemas.openxmlformats.org/officeDocument/2006/relationships" xmlns:p1510="http://schemas.microsoft.com/office/powerpoint/2015/10/main">
   <p1510:revLst>
-    <p1510:client id="{5A130347-CC42-49D2-8417-ED4FEE9D3E24}" v="12" dt="2018-10-24T22:40:01.507"/>
+    <p1510:client id="{5A130347-CC42-49D2-8417-ED4FEE9D3E24}" v="13" dt="2018-10-24T23:12:44.067"/>
   </p1510:revLst>
 </p1510:revInfo>
 </file>
@@ -125,12 +125,12 @@
   <pc:docChgLst>
     <pc:chgData name="Bence Kiss-Dobronyi" userId="115a7707-7158-443d-81e6-1600ef413af9" providerId="ADAL" clId="{5A130347-CC42-49D2-8417-ED4FEE9D3E24}"/>
     <pc:docChg chg="undo custSel modSld">
-      <pc:chgData name="Bence Kiss-Dobronyi" userId="115a7707-7158-443d-81e6-1600ef413af9" providerId="ADAL" clId="{5A130347-CC42-49D2-8417-ED4FEE9D3E24}" dt="2018-10-24T22:40:01.507" v="95" actId="13244"/>
+      <pc:chgData name="Bence Kiss-Dobronyi" userId="115a7707-7158-443d-81e6-1600ef413af9" providerId="ADAL" clId="{5A130347-CC42-49D2-8417-ED4FEE9D3E24}" dt="2018-10-24T23:13:48.767" v="107" actId="1076"/>
       <pc:docMkLst>
         <pc:docMk/>
       </pc:docMkLst>
       <pc:sldChg chg="addSp delSp modSp">
-        <pc:chgData name="Bence Kiss-Dobronyi" userId="115a7707-7158-443d-81e6-1600ef413af9" providerId="ADAL" clId="{5A130347-CC42-49D2-8417-ED4FEE9D3E24}" dt="2018-10-24T22:40:01.507" v="95" actId="13244"/>
+        <pc:chgData name="Bence Kiss-Dobronyi" userId="115a7707-7158-443d-81e6-1600ef413af9" providerId="ADAL" clId="{5A130347-CC42-49D2-8417-ED4FEE9D3E24}" dt="2018-10-24T23:13:48.767" v="107" actId="1076"/>
         <pc:sldMkLst>
           <pc:docMk/>
           <pc:sldMk cId="3479386836" sldId="256"/>
@@ -215,8 +215,8 @@
             <ac:grpSpMk id="53" creationId="{DD3D60E5-265F-4787-ADE6-082997AD4790}"/>
           </ac:grpSpMkLst>
         </pc:grpChg>
-        <pc:picChg chg="add mod">
-          <ac:chgData name="Bence Kiss-Dobronyi" userId="115a7707-7158-443d-81e6-1600ef413af9" providerId="ADAL" clId="{5A130347-CC42-49D2-8417-ED4FEE9D3E24}" dt="2018-10-24T22:40:01.507" v="95" actId="13244"/>
+        <pc:picChg chg="add mod modCrop">
+          <ac:chgData name="Bence Kiss-Dobronyi" userId="115a7707-7158-443d-81e6-1600ef413af9" providerId="ADAL" clId="{5A130347-CC42-49D2-8417-ED4FEE9D3E24}" dt="2018-10-24T23:13:06.309" v="99" actId="732"/>
           <ac:picMkLst>
             <pc:docMk/>
             <pc:sldMk cId="3479386836" sldId="256"/>
@@ -237,6 +237,14 @@
             <pc:docMk/>
             <pc:sldMk cId="3479386836" sldId="256"/>
             <ac:picMk id="9" creationId="{C24645D8-EE31-48EC-A557-1EBA2CEF4AD5}"/>
+          </ac:picMkLst>
+        </pc:picChg>
+        <pc:picChg chg="add mod modCrop">
+          <ac:chgData name="Bence Kiss-Dobronyi" userId="115a7707-7158-443d-81e6-1600ef413af9" providerId="ADAL" clId="{5A130347-CC42-49D2-8417-ED4FEE9D3E24}" dt="2018-10-24T23:13:48.767" v="107" actId="1076"/>
+          <ac:picMkLst>
+            <pc:docMk/>
+            <pc:sldMk cId="3479386836" sldId="256"/>
+            <ac:picMk id="14" creationId="{B0535980-7433-4710-8713-CF0527D74D2E}"/>
           </ac:picMkLst>
         </pc:picChg>
         <pc:picChg chg="add del mod ord">
@@ -3150,16 +3158,15 @@
           </p:cNvPicPr>
           <p:nvPr/>
         </p:nvPicPr>
-        <p:blipFill>
+        <p:blipFill rotWithShape="1">
           <a:blip r:embed="rId2"/>
-          <a:stretch>
-            <a:fillRect/>
-          </a:stretch>
+          <a:srcRect b="7099"/>
+          <a:stretch/>
         </p:blipFill>
         <p:spPr>
           <a:xfrm>
-            <a:off x="265" y="0"/>
-            <a:ext cx="14399683" cy="21599525"/>
+            <a:off x="265" y="1"/>
+            <a:ext cx="14399683" cy="20066000"/>
           </a:xfrm>
           <a:prstGeom prst="rect">
             <a:avLst/>
@@ -4190,6 +4197,35 @@
           </p:style>
         </p:cxnSp>
       </p:grpSp>
+      <p:pic>
+        <p:nvPicPr>
+          <p:cNvPr id="14" name="Picture 13">
+            <a:extLst>
+              <a:ext uri="{FF2B5EF4-FFF2-40B4-BE49-F238E27FC236}">
+                <a16:creationId xmlns:a16="http://schemas.microsoft.com/office/drawing/2014/main" id="{B0535980-7433-4710-8713-CF0527D74D2E}"/>
+              </a:ext>
+            </a:extLst>
+          </p:cNvPr>
+          <p:cNvPicPr>
+            <a:picLocks noChangeAspect="1"/>
+          </p:cNvPicPr>
+          <p:nvPr/>
+        </p:nvPicPr>
+        <p:blipFill rotWithShape="1">
+          <a:blip r:embed="rId2"/>
+          <a:srcRect l="19313" t="92592" b="2564"/>
+          <a:stretch/>
+        </p:blipFill>
+        <p:spPr>
+          <a:xfrm>
+            <a:off x="3224934" y="20323969"/>
+            <a:ext cx="10011997" cy="901659"/>
+          </a:xfrm>
+          <a:prstGeom prst="rect">
+            <a:avLst/>
+          </a:prstGeom>
+        </p:spPr>
+      </p:pic>
     </p:spTree>
     <p:extLst>
       <p:ext uri="{BB962C8B-B14F-4D97-AF65-F5344CB8AC3E}">

</xml_diff>